<commit_message>
Added formulas to ppt
</commit_message>
<xml_diff>
--- a/zzz MEDIA/Excel Basics.pptx
+++ b/zzz MEDIA/Excel Basics.pptx
@@ -5,7 +5,7 @@
     <p:sldMasterId id="2147483663" r:id="rId1"/>
   </p:sldMasterIdLst>
   <p:notesMasterIdLst>
-    <p:notesMasterId r:id="rId11"/>
+    <p:notesMasterId r:id="rId14"/>
   </p:notesMasterIdLst>
   <p:sldIdLst>
     <p:sldId id="256" r:id="rId2"/>
@@ -17,6 +17,9 @@
     <p:sldId id="264" r:id="rId8"/>
     <p:sldId id="262" r:id="rId9"/>
     <p:sldId id="263" r:id="rId10"/>
+    <p:sldId id="265" r:id="rId11"/>
+    <p:sldId id="266" r:id="rId12"/>
+    <p:sldId id="267" r:id="rId13"/>
   </p:sldIdLst>
   <p:sldSz cx="9144000" cy="6858000" type="screen4x3"/>
   <p:notesSz cx="6950075" cy="9236075"/>
@@ -255,6 +258,10 @@
     </p:ext>
   </p:extLst>
 </p:presentation>
+</file>
+
+<file path=ppt/revisionInfo.xml><?xml version="1.0" encoding="utf-8"?>
+<p1510:revInfo xmlns:a="http://schemas.openxmlformats.org/drawingml/2006/main" xmlns:r="http://schemas.openxmlformats.org/officeDocument/2006/relationships" xmlns:p1510="http://schemas.microsoft.com/office/powerpoint/2015/10/main"/>
 </file>
 
 <file path=ppt/notesMasters/notesMaster1.xml><?xml version="1.0" encoding="utf-8"?>
@@ -2718,6 +2725,115 @@
     <p:extLst>
       <p:ext uri="{BB962C8B-B14F-4D97-AF65-F5344CB8AC3E}">
         <p14:creationId xmlns:p14="http://schemas.microsoft.com/office/powerpoint/2010/main" val="1489356558"/>
+      </p:ext>
+    </p:extLst>
+  </p:cSld>
+  <p:clrMapOvr>
+    <a:masterClrMapping/>
+  </p:clrMapOvr>
+</p:notes>
+</file>
+
+<file path=ppt/notesSlides/notesSlide9.xml><?xml version="1.0" encoding="utf-8"?>
+<p:notes xmlns:a="http://schemas.openxmlformats.org/drawingml/2006/main" xmlns:r="http://schemas.openxmlformats.org/officeDocument/2006/relationships" xmlns:p="http://schemas.openxmlformats.org/presentationml/2006/main">
+  <p:cSld>
+    <p:spTree>
+      <p:nvGrpSpPr>
+        <p:cNvPr id="1" name=""/>
+        <p:cNvGrpSpPr/>
+        <p:nvPr/>
+      </p:nvGrpSpPr>
+      <p:grpSpPr>
+        <a:xfrm>
+          <a:off x="0" y="0"/>
+          <a:ext cx="0" cy="0"/>
+          <a:chOff x="0" y="0"/>
+          <a:chExt cx="0" cy="0"/>
+        </a:xfrm>
+      </p:grpSpPr>
+      <p:sp>
+        <p:nvSpPr>
+          <p:cNvPr id="2" name="Slide Image Placeholder 1"/>
+          <p:cNvSpPr>
+            <a:spLocks noGrp="1" noRot="1" noChangeAspect="1"/>
+          </p:cNvSpPr>
+          <p:nvPr>
+            <p:ph type="sldImg"/>
+          </p:nvPr>
+        </p:nvSpPr>
+        <p:spPr/>
+      </p:sp>
+      <p:sp>
+        <p:nvSpPr>
+          <p:cNvPr id="3" name="Notes Placeholder 2"/>
+          <p:cNvSpPr>
+            <a:spLocks noGrp="1"/>
+          </p:cNvSpPr>
+          <p:nvPr>
+            <p:ph type="body" idx="1"/>
+          </p:nvPr>
+        </p:nvSpPr>
+        <p:spPr/>
+        <p:txBody>
+          <a:bodyPr/>
+          <a:lstStyle/>
+          <a:p>
+            <a:endParaRPr lang="en-US" dirty="0"/>
+          </a:p>
+        </p:txBody>
+      </p:sp>
+      <p:sp>
+        <p:nvSpPr>
+          <p:cNvPr id="4" name="Slide Number Placeholder 3"/>
+          <p:cNvSpPr>
+            <a:spLocks noGrp="1"/>
+          </p:cNvSpPr>
+          <p:nvPr>
+            <p:ph type="sldNum" idx="10"/>
+          </p:nvPr>
+        </p:nvSpPr>
+        <p:spPr/>
+        <p:txBody>
+          <a:bodyPr/>
+          <a:lstStyle/>
+          <a:p>
+            <a:pPr marL="0" marR="0" lvl="0" indent="0" algn="r" rtl="0">
+              <a:spcBef>
+                <a:spcPts val="0"/>
+              </a:spcBef>
+              <a:spcAft>
+                <a:spcPts val="0"/>
+              </a:spcAft>
+              <a:buNone/>
+            </a:pPr>
+            <a:fld id="{00000000-1234-1234-1234-123412341234}" type="slidenum">
+              <a:rPr lang="en-US" sz="1200" b="0" i="0" u="none" strike="noStrike" cap="none" smtClean="0">
+                <a:solidFill>
+                  <a:schemeClr val="dk1"/>
+                </a:solidFill>
+                <a:latin typeface="Arial"/>
+                <a:ea typeface="Arial"/>
+                <a:cs typeface="Arial"/>
+                <a:sym typeface="Arial"/>
+              </a:rPr>
+              <a:t>10</a:t>
+            </a:fld>
+            <a:endParaRPr lang="en-US" sz="1200" b="0" i="0" u="none" strike="noStrike" cap="none">
+              <a:solidFill>
+                <a:schemeClr val="dk1"/>
+              </a:solidFill>
+              <a:latin typeface="Arial"/>
+              <a:ea typeface="Arial"/>
+              <a:cs typeface="Arial"/>
+              <a:sym typeface="Arial"/>
+            </a:endParaRPr>
+          </a:p>
+        </p:txBody>
+      </p:sp>
+    </p:spTree>
+    <p:extLst>
+      <p:ext uri="{BB962C8B-B14F-4D97-AF65-F5344CB8AC3E}">
+        <p14:creationId xmlns:p14="http://schemas.microsoft.com/office/powerpoint/2010/main" val="924903337"/>
       </p:ext>
     </p:extLst>
   </p:cSld>
@@ -12912,6 +13028,407 @@
 </p:sld>
 </file>
 
+<file path=ppt/slides/slide10.xml><?xml version="1.0" encoding="utf-8"?>
+<p:sld xmlns:a="http://schemas.openxmlformats.org/drawingml/2006/main" xmlns:r="http://schemas.openxmlformats.org/officeDocument/2006/relationships" xmlns:p="http://schemas.openxmlformats.org/presentationml/2006/main">
+  <p:cSld>
+    <p:spTree>
+      <p:nvGrpSpPr>
+        <p:cNvPr id="1" name=""/>
+        <p:cNvGrpSpPr/>
+        <p:nvPr/>
+      </p:nvGrpSpPr>
+      <p:grpSpPr>
+        <a:xfrm>
+          <a:off x="0" y="0"/>
+          <a:ext cx="0" cy="0"/>
+          <a:chOff x="0" y="0"/>
+          <a:chExt cx="0" cy="0"/>
+        </a:xfrm>
+      </p:grpSpPr>
+      <p:sp>
+        <p:nvSpPr>
+          <p:cNvPr id="3" name="Title 2">
+            <a:extLst>
+              <a:ext uri="{FF2B5EF4-FFF2-40B4-BE49-F238E27FC236}">
+                <a16:creationId xmlns:a16="http://schemas.microsoft.com/office/drawing/2014/main" id="{EE078754-30AA-4C20-8335-D87A47D7E33D}"/>
+              </a:ext>
+            </a:extLst>
+          </p:cNvPr>
+          <p:cNvSpPr>
+            <a:spLocks noGrp="1"/>
+          </p:cNvSpPr>
+          <p:nvPr>
+            <p:ph type="title"/>
+          </p:nvPr>
+        </p:nvSpPr>
+        <p:spPr/>
+        <p:txBody>
+          <a:bodyPr/>
+          <a:lstStyle/>
+          <a:p>
+            <a:r>
+              <a:rPr lang="en-US" dirty="0"/>
+              <a:t>Useful Starting Formulas</a:t>
+            </a:r>
+          </a:p>
+        </p:txBody>
+      </p:sp>
+      <p:sp>
+        <p:nvSpPr>
+          <p:cNvPr id="2" name="Slide Number Placeholder 1">
+            <a:extLst>
+              <a:ext uri="{FF2B5EF4-FFF2-40B4-BE49-F238E27FC236}">
+                <a16:creationId xmlns:a16="http://schemas.microsoft.com/office/drawing/2014/main" id="{B93A5DA5-FF98-4920-B370-FF24EA2D0034}"/>
+              </a:ext>
+            </a:extLst>
+          </p:cNvPr>
+          <p:cNvSpPr>
+            <a:spLocks noGrp="1"/>
+          </p:cNvSpPr>
+          <p:nvPr>
+            <p:ph type="sldNum" idx="12"/>
+          </p:nvPr>
+        </p:nvSpPr>
+        <p:spPr/>
+        <p:txBody>
+          <a:bodyPr/>
+          <a:lstStyle/>
+          <a:p>
+            <a:pPr marL="0" lvl="0" indent="0">
+              <a:spcBef>
+                <a:spcPts val="0"/>
+              </a:spcBef>
+              <a:spcAft>
+                <a:spcPts val="0"/>
+              </a:spcAft>
+              <a:buNone/>
+            </a:pPr>
+            <a:fld id="{00000000-1234-1234-1234-123412341234}" type="slidenum">
+              <a:rPr lang="en-US" smtClean="0"/>
+              <a:t>10</a:t>
+            </a:fld>
+            <a:endParaRPr lang="en-US"/>
+          </a:p>
+        </p:txBody>
+      </p:sp>
+    </p:spTree>
+    <p:extLst>
+      <p:ext uri="{BB962C8B-B14F-4D97-AF65-F5344CB8AC3E}">
+        <p14:creationId xmlns:p14="http://schemas.microsoft.com/office/powerpoint/2010/main" val="2713526087"/>
+      </p:ext>
+    </p:extLst>
+  </p:cSld>
+  <p:clrMapOvr>
+    <a:masterClrMapping/>
+  </p:clrMapOvr>
+</p:sld>
+</file>
+
+<file path=ppt/slides/slide11.xml><?xml version="1.0" encoding="utf-8"?>
+<p:sld xmlns:a="http://schemas.openxmlformats.org/drawingml/2006/main" xmlns:r="http://schemas.openxmlformats.org/officeDocument/2006/relationships" xmlns:p="http://schemas.openxmlformats.org/presentationml/2006/main">
+  <p:cSld>
+    <p:spTree>
+      <p:nvGrpSpPr>
+        <p:cNvPr id="1" name=""/>
+        <p:cNvGrpSpPr/>
+        <p:nvPr/>
+      </p:nvGrpSpPr>
+      <p:grpSpPr>
+        <a:xfrm>
+          <a:off x="0" y="0"/>
+          <a:ext cx="0" cy="0"/>
+          <a:chOff x="0" y="0"/>
+          <a:chExt cx="0" cy="0"/>
+        </a:xfrm>
+      </p:grpSpPr>
+      <p:sp>
+        <p:nvSpPr>
+          <p:cNvPr id="4" name="Slide Number Placeholder 3">
+            <a:extLst>
+              <a:ext uri="{FF2B5EF4-FFF2-40B4-BE49-F238E27FC236}">
+                <a16:creationId xmlns:a16="http://schemas.microsoft.com/office/drawing/2014/main" id="{D99A43E6-010F-4D2E-A9F3-6AC22079347C}"/>
+              </a:ext>
+            </a:extLst>
+          </p:cNvPr>
+          <p:cNvSpPr>
+            <a:spLocks noGrp="1"/>
+          </p:cNvSpPr>
+          <p:nvPr>
+            <p:ph type="sldNum" idx="12"/>
+          </p:nvPr>
+        </p:nvSpPr>
+        <p:spPr/>
+        <p:txBody>
+          <a:bodyPr/>
+          <a:lstStyle/>
+          <a:p>
+            <a:pPr marL="0" lvl="0" indent="0">
+              <a:spcBef>
+                <a:spcPts val="0"/>
+              </a:spcBef>
+              <a:spcAft>
+                <a:spcPts val="0"/>
+              </a:spcAft>
+              <a:buNone/>
+            </a:pPr>
+            <a:fld id="{00000000-1234-1234-1234-123412341234}" type="slidenum">
+              <a:rPr lang="en-US" smtClean="0"/>
+              <a:t>11</a:t>
+            </a:fld>
+            <a:endParaRPr lang="en-US"/>
+          </a:p>
+        </p:txBody>
+      </p:sp>
+      <p:sp>
+        <p:nvSpPr>
+          <p:cNvPr id="8" name="Shape 97">
+            <a:extLst>
+              <a:ext uri="{FF2B5EF4-FFF2-40B4-BE49-F238E27FC236}">
+                <a16:creationId xmlns:a16="http://schemas.microsoft.com/office/drawing/2014/main" id="{6CB9A70F-5EEA-474C-890F-06097050BA7B}"/>
+              </a:ext>
+            </a:extLst>
+          </p:cNvPr>
+          <p:cNvSpPr txBox="1"/>
+          <p:nvPr/>
+        </p:nvSpPr>
+        <p:spPr>
+          <a:xfrm>
+            <a:off x="381000" y="223650"/>
+            <a:ext cx="8382000" cy="457200"/>
+          </a:xfrm>
+          <a:prstGeom prst="rect">
+            <a:avLst/>
+          </a:prstGeom>
+          <a:noFill/>
+          <a:ln>
+            <a:noFill/>
+          </a:ln>
+        </p:spPr>
+        <p:txBody>
+          <a:bodyPr spcFirstLastPara="1" wrap="square" lIns="91425" tIns="45700" rIns="91425" bIns="45700" anchor="t" anchorCtr="0">
+            <a:noAutofit/>
+          </a:bodyPr>
+          <a:lstStyle/>
+          <a:p>
+            <a:pPr marL="0" marR="0" lvl="0" indent="0" algn="l" rtl="0">
+              <a:spcBef>
+                <a:spcPts val="0"/>
+              </a:spcBef>
+              <a:spcAft>
+                <a:spcPts val="0"/>
+              </a:spcAft>
+              <a:buNone/>
+            </a:pPr>
+            <a:r>
+              <a:rPr lang="en-US" sz="2400" b="1" dirty="0">
+                <a:solidFill>
+                  <a:srgbClr val="820009"/>
+                </a:solidFill>
+              </a:rPr>
+              <a:t>Booth Analytics Club Excel Cheat Sheet</a:t>
+            </a:r>
+            <a:endParaRPr sz="2400" b="1" dirty="0">
+              <a:solidFill>
+                <a:srgbClr val="820009"/>
+              </a:solidFill>
+              <a:latin typeface="Arial"/>
+              <a:ea typeface="Arial"/>
+              <a:cs typeface="Arial"/>
+              <a:sym typeface="Arial"/>
+            </a:endParaRPr>
+          </a:p>
+        </p:txBody>
+      </p:sp>
+      <p:sp>
+        <p:nvSpPr>
+          <p:cNvPr id="9" name="TextBox 8">
+            <a:extLst>
+              <a:ext uri="{FF2B5EF4-FFF2-40B4-BE49-F238E27FC236}">
+                <a16:creationId xmlns:a16="http://schemas.microsoft.com/office/drawing/2014/main" id="{BBD654A9-2C17-43A5-BE35-85AA85B0B9BA}"/>
+              </a:ext>
+            </a:extLst>
+          </p:cNvPr>
+          <p:cNvSpPr txBox="1"/>
+          <p:nvPr/>
+        </p:nvSpPr>
+        <p:spPr>
+          <a:xfrm>
+            <a:off x="474562" y="694483"/>
+            <a:ext cx="8171727" cy="738664"/>
+          </a:xfrm>
+          <a:prstGeom prst="rect">
+            <a:avLst/>
+          </a:prstGeom>
+          <a:noFill/>
+        </p:spPr>
+        <p:txBody>
+          <a:bodyPr wrap="square" rtlCol="0">
+            <a:spAutoFit/>
+          </a:bodyPr>
+          <a:lstStyle/>
+          <a:p>
+            <a:pPr marL="285750" indent="-285750">
+              <a:buFont typeface="Arial" panose="020B0604020202020204" pitchFamily="34" charset="0"/>
+              <a:buChar char="•"/>
+            </a:pPr>
+            <a:r>
+              <a:rPr lang="en-US" dirty="0"/>
+              <a:t>The Booth Analytics Club has prepared a cheat sheet that covers formulas and shortcuts that are particularly valuable to MBAs starting out with Excel. We’ve included the formulas in the following pages but the cheat sheet itself can be </a:t>
+            </a:r>
+            <a:r>
+              <a:rPr lang="en-US" dirty="0">
+                <a:hlinkClick r:id="rId2"/>
+              </a:rPr>
+              <a:t>downloaded here</a:t>
+            </a:r>
+            <a:r>
+              <a:rPr lang="en-US" dirty="0"/>
+              <a:t>.</a:t>
+            </a:r>
+          </a:p>
+        </p:txBody>
+      </p:sp>
+      <p:pic>
+        <p:nvPicPr>
+          <p:cNvPr id="10" name="Picture 9">
+            <a:extLst>
+              <a:ext uri="{FF2B5EF4-FFF2-40B4-BE49-F238E27FC236}">
+                <a16:creationId xmlns:a16="http://schemas.microsoft.com/office/drawing/2014/main" id="{9B18F8AB-2D44-41A2-B294-E7B0F5F2B3C9}"/>
+              </a:ext>
+            </a:extLst>
+          </p:cNvPr>
+          <p:cNvPicPr>
+            <a:picLocks noChangeAspect="1"/>
+          </p:cNvPicPr>
+          <p:nvPr/>
+        </p:nvPicPr>
+        <p:blipFill>
+          <a:blip r:embed="rId3"/>
+          <a:stretch>
+            <a:fillRect/>
+          </a:stretch>
+        </p:blipFill>
+        <p:spPr>
+          <a:xfrm>
+            <a:off x="1303626" y="1660771"/>
+            <a:ext cx="6513598" cy="4283804"/>
+          </a:xfrm>
+          <a:prstGeom prst="rect">
+            <a:avLst/>
+          </a:prstGeom>
+        </p:spPr>
+      </p:pic>
+    </p:spTree>
+    <p:extLst>
+      <p:ext uri="{BB962C8B-B14F-4D97-AF65-F5344CB8AC3E}">
+        <p14:creationId xmlns:p14="http://schemas.microsoft.com/office/powerpoint/2010/main" val="2746581445"/>
+      </p:ext>
+    </p:extLst>
+  </p:cSld>
+  <p:clrMapOvr>
+    <a:masterClrMapping/>
+  </p:clrMapOvr>
+</p:sld>
+</file>
+
+<file path=ppt/slides/slide12.xml><?xml version="1.0" encoding="utf-8"?>
+<p:sld xmlns:a="http://schemas.openxmlformats.org/drawingml/2006/main" xmlns:r="http://schemas.openxmlformats.org/officeDocument/2006/relationships" xmlns:p="http://schemas.openxmlformats.org/presentationml/2006/main">
+  <p:cSld>
+    <p:spTree>
+      <p:nvGrpSpPr>
+        <p:cNvPr id="1" name=""/>
+        <p:cNvGrpSpPr/>
+        <p:nvPr/>
+      </p:nvGrpSpPr>
+      <p:grpSpPr>
+        <a:xfrm>
+          <a:off x="0" y="0"/>
+          <a:ext cx="0" cy="0"/>
+          <a:chOff x="0" y="0"/>
+          <a:chExt cx="0" cy="0"/>
+        </a:xfrm>
+      </p:grpSpPr>
+      <p:sp>
+        <p:nvSpPr>
+          <p:cNvPr id="4" name="Slide Number Placeholder 3">
+            <a:extLst>
+              <a:ext uri="{FF2B5EF4-FFF2-40B4-BE49-F238E27FC236}">
+                <a16:creationId xmlns:a16="http://schemas.microsoft.com/office/drawing/2014/main" id="{D99A43E6-010F-4D2E-A9F3-6AC22079347C}"/>
+              </a:ext>
+            </a:extLst>
+          </p:cNvPr>
+          <p:cNvSpPr>
+            <a:spLocks noGrp="1"/>
+          </p:cNvSpPr>
+          <p:nvPr>
+            <p:ph type="sldNum" idx="12"/>
+          </p:nvPr>
+        </p:nvSpPr>
+        <p:spPr/>
+        <p:txBody>
+          <a:bodyPr/>
+          <a:lstStyle/>
+          <a:p>
+            <a:pPr marL="0" lvl="0" indent="0">
+              <a:spcBef>
+                <a:spcPts val="0"/>
+              </a:spcBef>
+              <a:spcAft>
+                <a:spcPts val="0"/>
+              </a:spcAft>
+              <a:buNone/>
+            </a:pPr>
+            <a:fld id="{00000000-1234-1234-1234-123412341234}" type="slidenum">
+              <a:rPr lang="en-US" smtClean="0"/>
+              <a:t>12</a:t>
+            </a:fld>
+            <a:endParaRPr lang="en-US"/>
+          </a:p>
+        </p:txBody>
+      </p:sp>
+      <p:pic>
+        <p:nvPicPr>
+          <p:cNvPr id="2" name="Picture 1">
+            <a:extLst>
+              <a:ext uri="{FF2B5EF4-FFF2-40B4-BE49-F238E27FC236}">
+                <a16:creationId xmlns:a16="http://schemas.microsoft.com/office/drawing/2014/main" id="{8B464950-1CB4-4C0F-9A3E-B0D9675AE6E6}"/>
+              </a:ext>
+            </a:extLst>
+          </p:cNvPr>
+          <p:cNvPicPr>
+            <a:picLocks noChangeAspect="1"/>
+          </p:cNvPicPr>
+          <p:nvPr/>
+        </p:nvPicPr>
+        <p:blipFill>
+          <a:blip r:embed="rId2"/>
+          <a:stretch>
+            <a:fillRect/>
+          </a:stretch>
+        </p:blipFill>
+        <p:spPr>
+          <a:xfrm>
+            <a:off x="992925" y="159900"/>
+            <a:ext cx="7158150" cy="5819558"/>
+          </a:xfrm>
+          <a:prstGeom prst="rect">
+            <a:avLst/>
+          </a:prstGeom>
+        </p:spPr>
+      </p:pic>
+    </p:spTree>
+    <p:extLst>
+      <p:ext uri="{BB962C8B-B14F-4D97-AF65-F5344CB8AC3E}">
+        <p14:creationId xmlns:p14="http://schemas.microsoft.com/office/powerpoint/2010/main" val="1163966741"/>
+      </p:ext>
+    </p:extLst>
+  </p:cSld>
+  <p:clrMapOvr>
+    <a:masterClrMapping/>
+  </p:clrMapOvr>
+</p:sld>
+</file>
+
 <file path=ppt/slides/slide2.xml><?xml version="1.0" encoding="utf-8"?>
 <p:sld xmlns:a="http://schemas.openxmlformats.org/drawingml/2006/main" xmlns:r="http://schemas.openxmlformats.org/officeDocument/2006/relationships" xmlns:p="http://schemas.openxmlformats.org/presentationml/2006/main">
   <p:cSld>

</xml_diff>